<commit_message>
Update User Research Methods.pptx
</commit_message>
<xml_diff>
--- a/Research Methods/User Research Methods.pptx
+++ b/Research Methods/User Research Methods.pptx
@@ -15,6 +15,7 @@
     <p:sldId id="260" r:id="rId9"/>
     <p:sldId id="261" r:id="rId10"/>
     <p:sldId id="262" r:id="rId11"/>
+    <p:sldId id="263" r:id="rId12"/>
   </p:sldIdLst>
   <p:sldSz cy="6858000" cx="12192000"/>
   <p:notesSz cx="6858000" cy="9144000"/>
@@ -1589,6 +1590,123 @@
           <a:xfrm>
             <a:off x="1143225" y="685800"/>
             <a:ext cx="4572225" cy="3429000"/>
+          </a:xfrm>
+          <a:custGeom>
+            <a:rect b="b" l="l" r="r" t="t"/>
+            <a:pathLst>
+              <a:path extrusionOk="0" h="120000" w="120000">
+                <a:moveTo>
+                  <a:pt x="0" y="0"/>
+                </a:moveTo>
+                <a:lnTo>
+                  <a:pt x="120000" y="0"/>
+                </a:lnTo>
+                <a:lnTo>
+                  <a:pt x="120000" y="120000"/>
+                </a:lnTo>
+                <a:lnTo>
+                  <a:pt x="0" y="120000"/>
+                </a:lnTo>
+                <a:close/>
+              </a:path>
+            </a:pathLst>
+          </a:custGeom>
+          <a:noFill/>
+          <a:ln cap="flat" cmpd="sng" w="9525">
+            <a:solidFill>
+              <a:srgbClr val="000000"/>
+            </a:solidFill>
+            <a:prstDash val="solid"/>
+            <a:round/>
+            <a:headEnd len="sm" w="sm" type="none"/>
+            <a:tailEnd len="sm" w="sm" type="none"/>
+          </a:ln>
+        </p:spPr>
+      </p:sp>
+    </p:spTree>
+  </p:cSld>
+  <p:clrMapOvr>
+    <a:masterClrMapping/>
+  </p:clrMapOvr>
+</p:notes>
+</file>
+
+<file path=ppt/notesSlides/notesSlide8.xml><?xml version="1.0" encoding="utf-8"?>
+<p:notes xmlns:a="http://schemas.openxmlformats.org/drawingml/2006/main" xmlns:r="http://schemas.openxmlformats.org/officeDocument/2006/relationships" xmlns:mc="http://schemas.openxmlformats.org/markup-compatibility/2006" xmlns:mv="urn:schemas-microsoft-com:mac:vml" xmlns:p="http://schemas.openxmlformats.org/presentationml/2006/main" xmlns:c="http://schemas.openxmlformats.org/drawingml/2006/chart" xmlns:dgm="http://schemas.openxmlformats.org/drawingml/2006/diagram" xmlns:o="urn:schemas-microsoft-com:office:office" xmlns:v="urn:schemas-microsoft-com:vml" xmlns:pvml="urn:schemas-microsoft-com:office:powerpoint" xmlns:com="http://schemas.openxmlformats.org/drawingml/2006/compatibility" xmlns:p14="http://schemas.microsoft.com/office/powerpoint/2010/main" xmlns:p15="http://schemas.microsoft.com/office/powerpoint/2012/main" showMasterPhAnim="0" showMasterSp="0">
+  <p:cSld>
+    <p:spTree>
+      <p:nvGrpSpPr>
+        <p:cNvPr id="116" name="Shape 116"/>
+        <p:cNvGrpSpPr/>
+        <p:nvPr/>
+      </p:nvGrpSpPr>
+      <p:grpSpPr>
+        <a:xfrm>
+          <a:off x="0" y="0"/>
+          <a:ext cx="0" cy="0"/>
+          <a:chOff x="0" y="0"/>
+          <a:chExt cx="0" cy="0"/>
+        </a:xfrm>
+      </p:grpSpPr>
+      <p:sp>
+        <p:nvSpPr>
+          <p:cNvPr id="117" name="Google Shape;117;g52f474ba06_1_0:notes"/>
+          <p:cNvSpPr txBox="1"/>
+          <p:nvPr>
+            <p:ph idx="1" type="body"/>
+          </p:nvPr>
+        </p:nvSpPr>
+        <p:spPr>
+          <a:xfrm>
+            <a:off x="685800" y="4343400"/>
+            <a:ext cx="5486400" cy="4114800"/>
+          </a:xfrm>
+          <a:prstGeom prst="rect">
+            <a:avLst/>
+          </a:prstGeom>
+          <a:noFill/>
+          <a:ln>
+            <a:noFill/>
+          </a:ln>
+        </p:spPr>
+        <p:txBody>
+          <a:bodyPr anchorCtr="0" anchor="t" bIns="91425" lIns="91425" spcFirstLastPara="1" rIns="91425" wrap="square" tIns="91425">
+            <a:noAutofit/>
+          </a:bodyPr>
+          <a:lstStyle/>
+          <a:p>
+            <a:pPr indent="0" lvl="0" marL="0" rtl="0" algn="l">
+              <a:lnSpc>
+                <a:spcPct val="100000"/>
+              </a:lnSpc>
+              <a:spcBef>
+                <a:spcPts val="0"/>
+              </a:spcBef>
+              <a:spcAft>
+                <a:spcPts val="0"/>
+              </a:spcAft>
+              <a:buSzPts val="1100"/>
+              <a:buNone/>
+            </a:pPr>
+            <a:r>
+              <a:t/>
+            </a:r>
+            <a:endParaRPr/>
+          </a:p>
+        </p:txBody>
+      </p:sp>
+      <p:sp>
+        <p:nvSpPr>
+          <p:cNvPr id="118" name="Google Shape;118;g52f474ba06_1_0:notes"/>
+          <p:cNvSpPr/>
+          <p:nvPr>
+            <p:ph idx="2" type="sldImg"/>
+          </p:nvPr>
+        </p:nvSpPr>
+        <p:spPr>
+          <a:xfrm>
+            <a:off x="1143225" y="685800"/>
+            <a:ext cx="4572300" cy="3429000"/>
           </a:xfrm>
           <a:custGeom>
             <a:rect b="b" l="l" r="r" t="t"/>
@@ -14957,8 +15075,8 @@
         </p:nvSpPr>
         <p:spPr>
           <a:xfrm>
-            <a:off x="1524000" y="1913860"/>
-            <a:ext cx="9144000" cy="864264"/>
+            <a:off x="150125" y="546000"/>
+            <a:ext cx="11935800" cy="598200"/>
           </a:xfrm>
           <a:prstGeom prst="rect">
             <a:avLst/>
@@ -15023,8 +15141,8 @@
         </p:nvSpPr>
         <p:spPr>
           <a:xfrm>
-            <a:off x="1524000" y="2966474"/>
-            <a:ext cx="9144000" cy="3526800"/>
+            <a:off x="150125" y="1312875"/>
+            <a:ext cx="11935800" cy="5302500"/>
           </a:xfrm>
           <a:prstGeom prst="rect">
             <a:avLst/>
@@ -15069,9 +15187,14 @@
                 <a:cs typeface="Arial"/>
                 <a:sym typeface="Arial"/>
               </a:rPr>
-              <a:t>Purpose of this presentation is to expand up on the Research Methods and real world project work where these Research methods were applied and whether or not the desired outcome was achieved in favour of the concerned organization.</a:t>
+              <a:t>Purpose of this presentation is to expand up on the Research Methods and real world project work where these Research methods were applied and whether or not the desired outcome was achieved in favour of the concerned organization.These slides also aim at expanding up on any lessons learnt and industry best practices too.</a:t>
             </a:r>
-            <a:endParaRPr/>
+            <a:endParaRPr sz="1600">
+              <a:latin typeface="Arial"/>
+              <a:ea typeface="Arial"/>
+              <a:cs typeface="Arial"/>
+              <a:sym typeface="Arial"/>
+            </a:endParaRPr>
           </a:p>
           <a:p>
             <a:pPr indent="0" lvl="0" marL="0" rtl="0" algn="l">
@@ -15079,7 +15202,7 @@
                 <a:spcPct val="90000"/>
               </a:lnSpc>
               <a:spcBef>
-                <a:spcPts val="1000"/>
+                <a:spcPts val="0"/>
               </a:spcBef>
               <a:spcAft>
                 <a:spcPts val="0"/>
@@ -15106,7 +15229,7 @@
                 <a:spcPct val="90000"/>
               </a:lnSpc>
               <a:spcBef>
-                <a:spcPts val="1000"/>
+                <a:spcPts val="0"/>
               </a:spcBef>
               <a:spcAft>
                 <a:spcPts val="0"/>
@@ -15124,9 +15247,14 @@
                 <a:cs typeface="Arial"/>
                 <a:sym typeface="Arial"/>
               </a:rPr>
-              <a:t>These slides also aim at expanding up on any lessons learnt and industry best practices too.</a:t>
+              <a:t>Of the phases of Pre-Discovery - Discovery - Alpha - Beta - Live - Retiring the service, the research work during following client assignments, can be grouped as below along with the year in which the research took place.</a:t>
             </a:r>
-            <a:endParaRPr/>
+            <a:endParaRPr sz="1600">
+              <a:latin typeface="Arial"/>
+              <a:ea typeface="Arial"/>
+              <a:cs typeface="Arial"/>
+              <a:sym typeface="Arial"/>
+            </a:endParaRPr>
           </a:p>
           <a:p>
             <a:pPr indent="0" lvl="0" marL="0" rtl="0" algn="l">
@@ -15134,7 +15262,7 @@
                 <a:spcPct val="90000"/>
               </a:lnSpc>
               <a:spcBef>
-                <a:spcPts val="1000"/>
+                <a:spcPts val="0"/>
               </a:spcBef>
               <a:spcAft>
                 <a:spcPts val="0"/>
@@ -15161,7 +15289,7 @@
                 <a:spcPct val="90000"/>
               </a:lnSpc>
               <a:spcBef>
-                <a:spcPts val="1000"/>
+                <a:spcPts val="0"/>
               </a:spcBef>
               <a:spcAft>
                 <a:spcPts val="0"/>
@@ -15172,6 +15300,15 @@
               <a:buSzPts val="1600"/>
               <a:buNone/>
             </a:pPr>
+            <a:r>
+              <a:rPr b="1" lang="en-GB" sz="1600">
+                <a:latin typeface="Arial"/>
+                <a:ea typeface="Arial"/>
+                <a:cs typeface="Arial"/>
+                <a:sym typeface="Arial"/>
+              </a:rPr>
+              <a:t>Pre-discovery / Discovery:</a:t>
+            </a:r>
             <a:r>
               <a:rPr lang="en-GB" sz="1600">
                 <a:latin typeface="Arial"/>
@@ -15179,65 +15316,7 @@
                 <a:cs typeface="Arial"/>
                 <a:sym typeface="Arial"/>
               </a:rPr>
-              <a:t>P.S: Not all of the research was during discovery phase. Research during discovery/pre-discovery were at:</a:t>
-            </a:r>
-            <a:endParaRPr/>
-          </a:p>
-          <a:p>
-            <a:pPr indent="-285750" lvl="0" marL="285750" rtl="0" algn="l">
-              <a:lnSpc>
-                <a:spcPct val="90000"/>
-              </a:lnSpc>
-              <a:spcBef>
-                <a:spcPts val="1000"/>
-              </a:spcBef>
-              <a:spcAft>
-                <a:spcPts val="0"/>
-              </a:spcAft>
-              <a:buClr>
-                <a:schemeClr val="dk1"/>
-              </a:buClr>
-              <a:buSzPts val="1600"/>
-              <a:buFont typeface="Arial"/>
-              <a:buChar char="-"/>
-            </a:pPr>
-            <a:r>
-              <a:rPr lang="en-GB" sz="1600">
-                <a:latin typeface="Arial"/>
-                <a:ea typeface="Arial"/>
-                <a:cs typeface="Arial"/>
-                <a:sym typeface="Arial"/>
-              </a:rPr>
-              <a:t>Students Loan Company</a:t>
-            </a:r>
-            <a:endParaRPr/>
-          </a:p>
-          <a:p>
-            <a:pPr indent="-285750" lvl="0" marL="285750" rtl="0" algn="l">
-              <a:lnSpc>
-                <a:spcPct val="90000"/>
-              </a:lnSpc>
-              <a:spcBef>
-                <a:spcPts val="1000"/>
-              </a:spcBef>
-              <a:spcAft>
-                <a:spcPts val="0"/>
-              </a:spcAft>
-              <a:buClr>
-                <a:schemeClr val="dk1"/>
-              </a:buClr>
-              <a:buSzPts val="1600"/>
-              <a:buFont typeface="Arial"/>
-              <a:buChar char="-"/>
-            </a:pPr>
-            <a:r>
-              <a:rPr lang="en-GB" sz="1600">
-                <a:latin typeface="Arial"/>
-                <a:ea typeface="Arial"/>
-                <a:cs typeface="Arial"/>
-                <a:sym typeface="Arial"/>
-              </a:rPr>
-              <a:t>Tesco Bank / Plc &amp;</a:t>
+              <a:t> </a:t>
             </a:r>
             <a:endParaRPr sz="1600">
               <a:latin typeface="Arial"/>
@@ -15247,19 +15326,19 @@
             </a:endParaRPr>
           </a:p>
           <a:p>
-            <a:pPr indent="-285750" lvl="0" marL="285750" rtl="0" algn="l">
-              <a:lnSpc>
-                <a:spcPct val="90000"/>
-              </a:lnSpc>
-              <a:spcBef>
-                <a:spcPts val="1000"/>
+            <a:pPr indent="-330200" lvl="0" marL="457200" rtl="0" algn="l">
+              <a:lnSpc>
+                <a:spcPct val="90000"/>
+              </a:lnSpc>
+              <a:spcBef>
+                <a:spcPts val="0"/>
               </a:spcBef>
               <a:spcAft>
                 <a:spcPts val="0"/>
               </a:spcAft>
               <a:buSzPts val="1600"/>
               <a:buFont typeface="Arial"/>
-              <a:buChar char="-"/>
+              <a:buChar char="●"/>
             </a:pPr>
             <a:r>
               <a:rPr lang="en-GB" sz="1600">
@@ -15268,7 +15347,435 @@
                 <a:cs typeface="Arial"/>
                 <a:sym typeface="Arial"/>
               </a:rPr>
-              <a:t>Ministry of Defence</a:t>
+              <a:t>Tesco Bank Money Manager solution 2011, </a:t>
+            </a:r>
+            <a:endParaRPr sz="1600">
+              <a:latin typeface="Arial"/>
+              <a:ea typeface="Arial"/>
+              <a:cs typeface="Arial"/>
+              <a:sym typeface="Arial"/>
+            </a:endParaRPr>
+          </a:p>
+          <a:p>
+            <a:pPr indent="-330200" lvl="0" marL="457200" rtl="0" algn="l">
+              <a:lnSpc>
+                <a:spcPct val="90000"/>
+              </a:lnSpc>
+              <a:spcBef>
+                <a:spcPts val="0"/>
+              </a:spcBef>
+              <a:spcAft>
+                <a:spcPts val="0"/>
+              </a:spcAft>
+              <a:buSzPts val="1600"/>
+              <a:buFont typeface="Arial"/>
+              <a:buChar char="●"/>
+            </a:pPr>
+            <a:r>
+              <a:rPr lang="en-GB" sz="1600">
+                <a:latin typeface="Arial"/>
+                <a:ea typeface="Arial"/>
+                <a:cs typeface="Arial"/>
+                <a:sym typeface="Arial"/>
+              </a:rPr>
+              <a:t>Bench-marked release of Monitise suite of mobile products 2013-14 (Market Research),</a:t>
+            </a:r>
+            <a:endParaRPr sz="1600">
+              <a:latin typeface="Arial"/>
+              <a:ea typeface="Arial"/>
+              <a:cs typeface="Arial"/>
+              <a:sym typeface="Arial"/>
+            </a:endParaRPr>
+          </a:p>
+          <a:p>
+            <a:pPr indent="-330200" lvl="0" marL="457200" rtl="0" algn="l">
+              <a:lnSpc>
+                <a:spcPct val="90000"/>
+              </a:lnSpc>
+              <a:spcBef>
+                <a:spcPts val="0"/>
+              </a:spcBef>
+              <a:spcAft>
+                <a:spcPts val="0"/>
+              </a:spcAft>
+              <a:buSzPts val="1600"/>
+              <a:buFont typeface="Arial"/>
+              <a:buChar char="●"/>
+            </a:pPr>
+            <a:r>
+              <a:rPr lang="en-GB" sz="1600">
+                <a:latin typeface="Arial"/>
+                <a:ea typeface="Arial"/>
+                <a:cs typeface="Arial"/>
+                <a:sym typeface="Arial"/>
+              </a:rPr>
+              <a:t>Students Loan Company Payment services 2018 and 2019, </a:t>
+            </a:r>
+            <a:endParaRPr sz="1600">
+              <a:latin typeface="Arial"/>
+              <a:ea typeface="Arial"/>
+              <a:cs typeface="Arial"/>
+              <a:sym typeface="Arial"/>
+            </a:endParaRPr>
+          </a:p>
+          <a:p>
+            <a:pPr indent="-330200" lvl="0" marL="457200" rtl="0" algn="l">
+              <a:lnSpc>
+                <a:spcPct val="90000"/>
+              </a:lnSpc>
+              <a:spcBef>
+                <a:spcPts val="0"/>
+              </a:spcBef>
+              <a:spcAft>
+                <a:spcPts val="0"/>
+              </a:spcAft>
+              <a:buSzPts val="1600"/>
+              <a:buFont typeface="Arial"/>
+              <a:buChar char="●"/>
+            </a:pPr>
+            <a:r>
+              <a:rPr lang="en-GB" sz="1600">
+                <a:latin typeface="Arial"/>
+                <a:ea typeface="Arial"/>
+                <a:cs typeface="Arial"/>
+                <a:sym typeface="Arial"/>
+              </a:rPr>
+              <a:t>Ministry of Defence Veterans UK 2019.</a:t>
+            </a:r>
+            <a:endParaRPr sz="1600">
+              <a:latin typeface="Arial"/>
+              <a:ea typeface="Arial"/>
+              <a:cs typeface="Arial"/>
+              <a:sym typeface="Arial"/>
+            </a:endParaRPr>
+          </a:p>
+          <a:p>
+            <a:pPr indent="0" lvl="0" marL="0" rtl="0" algn="l">
+              <a:lnSpc>
+                <a:spcPct val="90000"/>
+              </a:lnSpc>
+              <a:spcBef>
+                <a:spcPts val="0"/>
+              </a:spcBef>
+              <a:spcAft>
+                <a:spcPts val="0"/>
+              </a:spcAft>
+              <a:buClr>
+                <a:schemeClr val="dk1"/>
+              </a:buClr>
+              <a:buSzPts val="1600"/>
+              <a:buNone/>
+            </a:pPr>
+            <a:r>
+              <a:t/>
+            </a:r>
+            <a:endParaRPr sz="1600">
+              <a:latin typeface="Arial"/>
+              <a:ea typeface="Arial"/>
+              <a:cs typeface="Arial"/>
+              <a:sym typeface="Arial"/>
+            </a:endParaRPr>
+          </a:p>
+          <a:p>
+            <a:pPr indent="0" lvl="0" marL="0" rtl="0" algn="l">
+              <a:lnSpc>
+                <a:spcPct val="90000"/>
+              </a:lnSpc>
+              <a:spcBef>
+                <a:spcPts val="0"/>
+              </a:spcBef>
+              <a:spcAft>
+                <a:spcPts val="0"/>
+              </a:spcAft>
+              <a:buClr>
+                <a:schemeClr val="dk1"/>
+              </a:buClr>
+              <a:buSzPts val="1600"/>
+              <a:buNone/>
+            </a:pPr>
+            <a:r>
+              <a:rPr b="1" lang="en-GB" sz="1600">
+                <a:latin typeface="Arial"/>
+                <a:ea typeface="Arial"/>
+                <a:cs typeface="Arial"/>
+                <a:sym typeface="Arial"/>
+              </a:rPr>
+              <a:t>Alpha:</a:t>
+            </a:r>
+            <a:r>
+              <a:rPr lang="en-GB" sz="1600">
+                <a:latin typeface="Arial"/>
+                <a:ea typeface="Arial"/>
+                <a:cs typeface="Arial"/>
+                <a:sym typeface="Arial"/>
+              </a:rPr>
+              <a:t> </a:t>
+            </a:r>
+            <a:endParaRPr sz="1600">
+              <a:latin typeface="Arial"/>
+              <a:ea typeface="Arial"/>
+              <a:cs typeface="Arial"/>
+              <a:sym typeface="Arial"/>
+            </a:endParaRPr>
+          </a:p>
+          <a:p>
+            <a:pPr indent="-330200" lvl="0" marL="457200" rtl="0" algn="l">
+              <a:lnSpc>
+                <a:spcPct val="90000"/>
+              </a:lnSpc>
+              <a:spcBef>
+                <a:spcPts val="0"/>
+              </a:spcBef>
+              <a:spcAft>
+                <a:spcPts val="0"/>
+              </a:spcAft>
+              <a:buSzPts val="1600"/>
+              <a:buFont typeface="Arial"/>
+              <a:buChar char="●"/>
+            </a:pPr>
+            <a:r>
+              <a:rPr lang="en-GB" sz="1600">
+                <a:latin typeface="Arial"/>
+                <a:ea typeface="Arial"/>
+                <a:cs typeface="Arial"/>
+                <a:sym typeface="Arial"/>
+              </a:rPr>
+              <a:t>Tesco Bank / Plc Single Sign-on 2013,</a:t>
+            </a:r>
+            <a:endParaRPr sz="1600">
+              <a:latin typeface="Arial"/>
+              <a:ea typeface="Arial"/>
+              <a:cs typeface="Arial"/>
+              <a:sym typeface="Arial"/>
+            </a:endParaRPr>
+          </a:p>
+          <a:p>
+            <a:pPr indent="-330200" lvl="0" marL="457200" rtl="0" algn="l">
+              <a:lnSpc>
+                <a:spcPct val="90000"/>
+              </a:lnSpc>
+              <a:spcBef>
+                <a:spcPts val="0"/>
+              </a:spcBef>
+              <a:spcAft>
+                <a:spcPts val="0"/>
+              </a:spcAft>
+              <a:buSzPts val="1600"/>
+              <a:buFont typeface="Arial"/>
+              <a:buChar char="●"/>
+            </a:pPr>
+            <a:r>
+              <a:rPr lang="en-GB" sz="1600">
+                <a:latin typeface="Arial"/>
+                <a:ea typeface="Arial"/>
+                <a:cs typeface="Arial"/>
+                <a:sym typeface="Arial"/>
+              </a:rPr>
+              <a:t>Monitise Mobile Messaging Engine 2013</a:t>
+            </a:r>
+            <a:endParaRPr sz="1600">
+              <a:latin typeface="Arial"/>
+              <a:ea typeface="Arial"/>
+              <a:cs typeface="Arial"/>
+              <a:sym typeface="Arial"/>
+            </a:endParaRPr>
+          </a:p>
+          <a:p>
+            <a:pPr indent="0" lvl="0" marL="0" rtl="0" algn="l">
+              <a:lnSpc>
+                <a:spcPct val="90000"/>
+              </a:lnSpc>
+              <a:spcBef>
+                <a:spcPts val="0"/>
+              </a:spcBef>
+              <a:spcAft>
+                <a:spcPts val="0"/>
+              </a:spcAft>
+              <a:buClr>
+                <a:schemeClr val="dk1"/>
+              </a:buClr>
+              <a:buSzPts val="1600"/>
+              <a:buNone/>
+            </a:pPr>
+            <a:r>
+              <a:t/>
+            </a:r>
+            <a:endParaRPr sz="1600">
+              <a:latin typeface="Arial"/>
+              <a:ea typeface="Arial"/>
+              <a:cs typeface="Arial"/>
+              <a:sym typeface="Arial"/>
+            </a:endParaRPr>
+          </a:p>
+          <a:p>
+            <a:pPr indent="0" lvl="0" marL="0" rtl="0" algn="l">
+              <a:lnSpc>
+                <a:spcPct val="90000"/>
+              </a:lnSpc>
+              <a:spcBef>
+                <a:spcPts val="0"/>
+              </a:spcBef>
+              <a:spcAft>
+                <a:spcPts val="0"/>
+              </a:spcAft>
+              <a:buClr>
+                <a:schemeClr val="dk1"/>
+              </a:buClr>
+              <a:buSzPts val="1600"/>
+              <a:buNone/>
+            </a:pPr>
+            <a:r>
+              <a:rPr b="1" lang="en-GB" sz="1600">
+                <a:latin typeface="Arial"/>
+                <a:ea typeface="Arial"/>
+                <a:cs typeface="Arial"/>
+                <a:sym typeface="Arial"/>
+              </a:rPr>
+              <a:t>Beta followed by live:</a:t>
+            </a:r>
+            <a:endParaRPr sz="1600">
+              <a:latin typeface="Arial"/>
+              <a:ea typeface="Arial"/>
+              <a:cs typeface="Arial"/>
+              <a:sym typeface="Arial"/>
+            </a:endParaRPr>
+          </a:p>
+          <a:p>
+            <a:pPr indent="-330200" lvl="0" marL="457200" rtl="0" algn="l">
+              <a:lnSpc>
+                <a:spcPct val="90000"/>
+              </a:lnSpc>
+              <a:spcBef>
+                <a:spcPts val="0"/>
+              </a:spcBef>
+              <a:spcAft>
+                <a:spcPts val="0"/>
+              </a:spcAft>
+              <a:buSzPts val="1600"/>
+              <a:buFont typeface="Arial"/>
+              <a:buChar char="●"/>
+            </a:pPr>
+            <a:r>
+              <a:rPr lang="en-GB" sz="1600">
+                <a:latin typeface="Arial"/>
+                <a:ea typeface="Arial"/>
+                <a:cs typeface="Arial"/>
+                <a:sym typeface="Arial"/>
+              </a:rPr>
+              <a:t>Students Loan Company introducing a new grant to existing loan application 2018. Live pages on government website </a:t>
+            </a:r>
+            <a:r>
+              <a:rPr lang="en-GB" sz="1200" u="sng">
+                <a:solidFill>
+                  <a:schemeClr val="hlink"/>
+                </a:solidFill>
+                <a:latin typeface="Arial"/>
+                <a:ea typeface="Arial"/>
+                <a:cs typeface="Arial"/>
+                <a:sym typeface="Arial"/>
+                <a:hlinkClick r:id="rId3"/>
+              </a:rPr>
+              <a:t>https://github.com/RaghavanKasthuri/User-Experience-UX-/blob/master/Interactive%20Design/Screens%20designed%20live%20on%20Student%20Finance%20England.pptx</a:t>
+            </a:r>
+            <a:endParaRPr sz="1600">
+              <a:latin typeface="Arial"/>
+              <a:ea typeface="Arial"/>
+              <a:cs typeface="Arial"/>
+              <a:sym typeface="Arial"/>
+            </a:endParaRPr>
+          </a:p>
+          <a:p>
+            <a:pPr indent="0" lvl="0" marL="0" rtl="0" algn="l">
+              <a:lnSpc>
+                <a:spcPct val="90000"/>
+              </a:lnSpc>
+              <a:spcBef>
+                <a:spcPts val="0"/>
+              </a:spcBef>
+              <a:spcAft>
+                <a:spcPts val="0"/>
+              </a:spcAft>
+              <a:buClr>
+                <a:schemeClr val="dk1"/>
+              </a:buClr>
+              <a:buSzPts val="1600"/>
+              <a:buNone/>
+            </a:pPr>
+            <a:r>
+              <a:t/>
+            </a:r>
+            <a:endParaRPr sz="1600">
+              <a:latin typeface="Arial"/>
+              <a:ea typeface="Arial"/>
+              <a:cs typeface="Arial"/>
+              <a:sym typeface="Arial"/>
+            </a:endParaRPr>
+          </a:p>
+          <a:p>
+            <a:pPr indent="0" lvl="0" marL="0" rtl="0" algn="l">
+              <a:lnSpc>
+                <a:spcPct val="90000"/>
+              </a:lnSpc>
+              <a:spcBef>
+                <a:spcPts val="0"/>
+              </a:spcBef>
+              <a:spcAft>
+                <a:spcPts val="0"/>
+              </a:spcAft>
+              <a:buClr>
+                <a:schemeClr val="dk1"/>
+              </a:buClr>
+              <a:buSzPts val="1600"/>
+              <a:buNone/>
+            </a:pPr>
+            <a:r>
+              <a:rPr b="1" lang="en-GB" sz="1600">
+                <a:latin typeface="Arial"/>
+                <a:ea typeface="Arial"/>
+                <a:cs typeface="Arial"/>
+                <a:sym typeface="Arial"/>
+              </a:rPr>
+              <a:t>Retiring the service:</a:t>
+            </a:r>
+            <a:r>
+              <a:rPr lang="en-GB" sz="1600">
+                <a:latin typeface="Arial"/>
+                <a:ea typeface="Arial"/>
+                <a:cs typeface="Arial"/>
+                <a:sym typeface="Arial"/>
+              </a:rPr>
+              <a:t> </a:t>
+            </a:r>
+            <a:endParaRPr sz="1600">
+              <a:latin typeface="Arial"/>
+              <a:ea typeface="Arial"/>
+              <a:cs typeface="Arial"/>
+              <a:sym typeface="Arial"/>
+            </a:endParaRPr>
+          </a:p>
+          <a:p>
+            <a:pPr indent="-330200" lvl="0" marL="457200" rtl="0" algn="l">
+              <a:lnSpc>
+                <a:spcPct val="90000"/>
+              </a:lnSpc>
+              <a:spcBef>
+                <a:spcPts val="0"/>
+              </a:spcBef>
+              <a:spcAft>
+                <a:spcPts val="0"/>
+              </a:spcAft>
+              <a:buSzPts val="1600"/>
+              <a:buFont typeface="Arial"/>
+              <a:buChar char="●"/>
+            </a:pPr>
+            <a:r>
+              <a:rPr lang="en-GB" sz="1600">
+                <a:latin typeface="Arial"/>
+                <a:ea typeface="Arial"/>
+                <a:cs typeface="Arial"/>
+                <a:sym typeface="Arial"/>
+              </a:rPr>
+              <a:t>Not had an opportunity to research during this phase till date.</a:t>
             </a:r>
             <a:endParaRPr sz="1600">
               <a:latin typeface="Arial"/>
@@ -15323,7 +15830,7 @@
           <a:noFill/>
           <a:ln cap="flat" cmpd="sng" w="9525">
             <a:solidFill>
-              <a:srgbClr val="6AA84F"/>
+              <a:srgbClr val="FF0000"/>
             </a:solidFill>
             <a:prstDash val="solid"/>
             <a:round/>
@@ -15487,6 +15994,30 @@
                 <a:sym typeface="Arial"/>
               </a:rPr>
               <a:t>Tesco Plc and Tesco Bank </a:t>
+            </a:r>
+            <a:r>
+              <a:rPr b="1" lang="en-GB" sz="1600">
+                <a:solidFill>
+                  <a:srgbClr val="FF0000"/>
+                </a:solidFill>
+                <a:latin typeface="Arial"/>
+                <a:ea typeface="Arial"/>
+                <a:cs typeface="Arial"/>
+                <a:sym typeface="Arial"/>
+              </a:rPr>
+              <a:t>during alpha phase</a:t>
+            </a:r>
+            <a:r>
+              <a:rPr lang="en-GB" sz="1600">
+                <a:solidFill>
+                  <a:srgbClr val="00B050"/>
+                </a:solidFill>
+                <a:latin typeface="Arial"/>
+                <a:ea typeface="Arial"/>
+                <a:cs typeface="Arial"/>
+                <a:sym typeface="Arial"/>
+              </a:rPr>
+              <a:t> </a:t>
             </a:r>
             <a:r>
               <a:rPr lang="en-GB" sz="1600">
@@ -15790,7 +16321,31 @@
                 <a:cs typeface="Arial"/>
                 <a:sym typeface="Arial"/>
               </a:rPr>
-              <a:t>Students Loan Company.</a:t>
+              <a:t>Students Loan Company </a:t>
+            </a:r>
+            <a:r>
+              <a:rPr b="1" lang="en-GB" sz="1600">
+                <a:solidFill>
+                  <a:srgbClr val="FF0000"/>
+                </a:solidFill>
+                <a:latin typeface="Arial"/>
+                <a:ea typeface="Arial"/>
+                <a:cs typeface="Arial"/>
+                <a:sym typeface="Arial"/>
+              </a:rPr>
+              <a:t>during beta phase followed by live</a:t>
+            </a:r>
+            <a:r>
+              <a:rPr lang="en-GB" sz="1600">
+                <a:solidFill>
+                  <a:srgbClr val="00B050"/>
+                </a:solidFill>
+                <a:latin typeface="Arial"/>
+                <a:ea typeface="Arial"/>
+                <a:cs typeface="Arial"/>
+                <a:sym typeface="Arial"/>
+              </a:rPr>
+              <a:t> .</a:t>
             </a:r>
             <a:r>
               <a:rPr lang="en-GB" sz="1600">
@@ -15900,7 +16455,7 @@
                 <a:cs typeface="Arial"/>
                 <a:sym typeface="Arial"/>
               </a:rPr>
-              <a:t>2) December 2018: Lab based usability test during discovery in iterations while at </a:t>
+              <a:t>2) December 2018 and early 2019: Lab based usability test during discovery in iterations while at </a:t>
             </a:r>
             <a:r>
               <a:rPr lang="en-GB" sz="1600">
@@ -15912,7 +16467,31 @@
                 <a:cs typeface="Arial"/>
                 <a:sym typeface="Arial"/>
               </a:rPr>
-              <a:t>Students Loan Company. </a:t>
+              <a:t>Students Loan Company </a:t>
+            </a:r>
+            <a:r>
+              <a:rPr b="1" lang="en-GB" sz="1600">
+                <a:solidFill>
+                  <a:srgbClr val="FF0000"/>
+                </a:solidFill>
+                <a:latin typeface="Arial"/>
+                <a:ea typeface="Arial"/>
+                <a:cs typeface="Arial"/>
+                <a:sym typeface="Arial"/>
+              </a:rPr>
+              <a:t>during discovery phase</a:t>
+            </a:r>
+            <a:r>
+              <a:rPr lang="en-GB" sz="1600">
+                <a:solidFill>
+                  <a:srgbClr val="00B050"/>
+                </a:solidFill>
+                <a:latin typeface="Arial"/>
+                <a:ea typeface="Arial"/>
+                <a:cs typeface="Arial"/>
+                <a:sym typeface="Arial"/>
+              </a:rPr>
+              <a:t>. </a:t>
             </a:r>
             <a:r>
               <a:rPr lang="en-GB" sz="1600">
@@ -16229,6 +16808,30 @@
               <a:t>Tesco Bank’s dilemma </a:t>
             </a:r>
             <a:r>
+              <a:rPr b="1" lang="en-GB" sz="1600">
+                <a:solidFill>
+                  <a:srgbClr val="FF0000"/>
+                </a:solidFill>
+                <a:latin typeface="Arial"/>
+                <a:ea typeface="Arial"/>
+                <a:cs typeface="Arial"/>
+                <a:sym typeface="Arial"/>
+              </a:rPr>
+              <a:t>during alpha phase</a:t>
+            </a:r>
+            <a:r>
+              <a:rPr lang="en-GB" sz="1600">
+                <a:solidFill>
+                  <a:srgbClr val="00B050"/>
+                </a:solidFill>
+                <a:latin typeface="Arial"/>
+                <a:ea typeface="Arial"/>
+                <a:cs typeface="Arial"/>
+                <a:sym typeface="Arial"/>
+              </a:rPr>
+              <a:t> </a:t>
+            </a:r>
+            <a:r>
               <a:rPr lang="en-GB" sz="1600">
                 <a:latin typeface="Arial"/>
                 <a:ea typeface="Arial"/>
@@ -16435,7 +17038,19 @@
                 <a:cs typeface="Arial"/>
                 <a:sym typeface="Arial"/>
               </a:rPr>
-              <a:t>Ministry of Defence’s quantitative survey</a:t>
+              <a:t>Ministry of Defence’s quantitative survey </a:t>
+            </a:r>
+            <a:r>
+              <a:rPr b="1" lang="en-GB" sz="1600">
+                <a:solidFill>
+                  <a:srgbClr val="FF0000"/>
+                </a:solidFill>
+                <a:latin typeface="Arial"/>
+                <a:ea typeface="Arial"/>
+                <a:cs typeface="Arial"/>
+                <a:sym typeface="Arial"/>
+              </a:rPr>
+              <a:t>during pre-discovery and discovery phase</a:t>
             </a:r>
             <a:r>
               <a:rPr lang="en-GB" sz="1600">
@@ -16444,25 +17059,7 @@
                 <a:cs typeface="Arial"/>
                 <a:sym typeface="Arial"/>
               </a:rPr>
-              <a:t> to understand veteran users background and a </a:t>
-            </a:r>
-            <a:r>
-              <a:rPr lang="en-GB" sz="1600">
-                <a:latin typeface="Arial"/>
-                <a:ea typeface="Arial"/>
-                <a:cs typeface="Arial"/>
-                <a:sym typeface="Arial"/>
-              </a:rPr>
-              <a:t>questionnaire</a:t>
-            </a:r>
-            <a:r>
-              <a:rPr lang="en-GB" sz="1600">
-                <a:latin typeface="Arial"/>
-                <a:ea typeface="Arial"/>
-                <a:cs typeface="Arial"/>
-                <a:sym typeface="Arial"/>
-              </a:rPr>
-              <a:t> aimed to learn more about the veteran users in context of digital inclusion and assisted digital. This was as well updated on public government blogs to carry out this research in a very public manner.</a:t>
+              <a:t> to understand veteran users background and a questionnaire aimed to learn more about the veteran users in context of digital inclusion and assisted digital. This was as well updated on public government blogs to carry out this research in a very public manner.</a:t>
             </a:r>
             <a:endParaRPr sz="1600">
               <a:latin typeface="Arial"/>
@@ -16695,19 +17292,19 @@
                 <a:cs typeface="Arial"/>
                 <a:sym typeface="Arial"/>
               </a:rPr>
-              <a:t>1) November 2013: Focus Group to assess the idea of whether </a:t>
+              <a:t>1) November 2013: Focus Group to assess the idea </a:t>
             </a:r>
             <a:r>
-              <a:rPr lang="en-GB" sz="1600">
-                <a:solidFill>
-                  <a:srgbClr val="00B050"/>
+              <a:rPr b="1" lang="en-GB" sz="1600">
+                <a:solidFill>
+                  <a:srgbClr val="FF0000"/>
                 </a:solidFill>
                 <a:latin typeface="Arial"/>
                 <a:ea typeface="Arial"/>
                 <a:cs typeface="Arial"/>
                 <a:sym typeface="Arial"/>
               </a:rPr>
-              <a:t>Monitise</a:t>
+              <a:t>during alpha phase</a:t>
             </a:r>
             <a:r>
               <a:rPr lang="en-GB" sz="1600">
@@ -16716,7 +17313,37 @@
                 <a:cs typeface="Arial"/>
                 <a:sym typeface="Arial"/>
               </a:rPr>
-              <a:t> United States Mobile Messaging Engine could be customized to the needs of the customers across Monitise UK and Europe.</a:t>
+              <a:t> as to</a:t>
+            </a:r>
+            <a:r>
+              <a:rPr lang="en-GB" sz="1600">
+                <a:latin typeface="Arial"/>
+                <a:ea typeface="Arial"/>
+                <a:cs typeface="Arial"/>
+                <a:sym typeface="Arial"/>
+              </a:rPr>
+              <a:t> whether </a:t>
+            </a:r>
+            <a:r>
+              <a:rPr lang="en-GB" sz="1600">
+                <a:solidFill>
+                  <a:srgbClr val="00B050"/>
+                </a:solidFill>
+                <a:latin typeface="Arial"/>
+                <a:ea typeface="Arial"/>
+                <a:cs typeface="Arial"/>
+                <a:sym typeface="Arial"/>
+              </a:rPr>
+              <a:t>Monitise </a:t>
+            </a:r>
+            <a:r>
+              <a:rPr lang="en-GB" sz="1600">
+                <a:latin typeface="Arial"/>
+                <a:ea typeface="Arial"/>
+                <a:cs typeface="Arial"/>
+                <a:sym typeface="Arial"/>
+              </a:rPr>
+              <a:t>United States Mobile Messaging Engine could be customized to the needs of the customers across Monitise UK and Europe.</a:t>
             </a:r>
             <a:endParaRPr/>
           </a:p>
@@ -17221,16 +17848,7 @@
                 <a:cs typeface="Arial"/>
                 <a:sym typeface="Arial"/>
               </a:rPr>
-              <a:t>December 2018: </a:t>
-            </a:r>
-            <a:r>
-              <a:rPr lang="en-GB" sz="1600">
-                <a:latin typeface="Arial"/>
-                <a:ea typeface="Arial"/>
-                <a:cs typeface="Arial"/>
-                <a:sym typeface="Arial"/>
-              </a:rPr>
-              <a:t>Metrics produced by Google Analytics was shared across all UX Researchers and UX designers at </a:t>
+              <a:t>December 2018: Metrics produced by Google Analytics was shared across all UX Researchers and UX designers at </a:t>
             </a:r>
             <a:r>
               <a:rPr lang="en-GB" sz="1600">
@@ -17279,16 +17897,7 @@
                 <a:cs typeface="Arial"/>
                 <a:sym typeface="Arial"/>
               </a:rPr>
-              <a:t>February 2010: </a:t>
-            </a:r>
-            <a:r>
-              <a:rPr lang="en-GB" sz="1600">
-                <a:latin typeface="Arial"/>
-                <a:ea typeface="Arial"/>
-                <a:cs typeface="Arial"/>
-                <a:sym typeface="Arial"/>
-              </a:rPr>
-              <a:t>Performance metrics at </a:t>
+              <a:t>February 2010: Performance metrics at </a:t>
             </a:r>
             <a:r>
               <a:rPr lang="en-GB" sz="1600">
@@ -17383,6 +17992,238 @@
             </a:pPr>
             <a:r>
               <a:t/>
+            </a:r>
+            <a:endParaRPr sz="1600">
+              <a:latin typeface="Arial"/>
+              <a:ea typeface="Arial"/>
+              <a:cs typeface="Arial"/>
+              <a:sym typeface="Arial"/>
+            </a:endParaRPr>
+          </a:p>
+          <a:p>
+            <a:pPr indent="0" lvl="0" marL="0" rtl="0" algn="l">
+              <a:lnSpc>
+                <a:spcPct val="90000"/>
+              </a:lnSpc>
+              <a:spcBef>
+                <a:spcPts val="1000"/>
+              </a:spcBef>
+              <a:spcAft>
+                <a:spcPts val="0"/>
+              </a:spcAft>
+              <a:buClr>
+                <a:schemeClr val="dk1"/>
+              </a:buClr>
+              <a:buSzPts val="1800"/>
+              <a:buNone/>
+            </a:pPr>
+            <a:r>
+              <a:t/>
+            </a:r>
+            <a:endParaRPr sz="1800">
+              <a:solidFill>
+                <a:srgbClr val="00B050"/>
+              </a:solidFill>
+              <a:latin typeface="Arial"/>
+              <a:ea typeface="Arial"/>
+              <a:cs typeface="Arial"/>
+              <a:sym typeface="Arial"/>
+            </a:endParaRPr>
+          </a:p>
+        </p:txBody>
+      </p:sp>
+    </p:spTree>
+  </p:cSld>
+  <p:clrMapOvr>
+    <a:masterClrMapping/>
+  </p:clrMapOvr>
+</p:sld>
+</file>
+
+<file path=ppt/slides/slide8.xml><?xml version="1.0" encoding="utf-8"?>
+<p:sld xmlns:a="http://schemas.openxmlformats.org/drawingml/2006/main" xmlns:r="http://schemas.openxmlformats.org/officeDocument/2006/relationships" xmlns:mc="http://schemas.openxmlformats.org/markup-compatibility/2006" xmlns:mv="urn:schemas-microsoft-com:mac:vml" xmlns:p="http://schemas.openxmlformats.org/presentationml/2006/main" xmlns:c="http://schemas.openxmlformats.org/drawingml/2006/chart" xmlns:dgm="http://schemas.openxmlformats.org/drawingml/2006/diagram" xmlns:o="urn:schemas-microsoft-com:office:office" xmlns:v="urn:schemas-microsoft-com:vml" xmlns:pvml="urn:schemas-microsoft-com:office:powerpoint" xmlns:com="http://schemas.openxmlformats.org/drawingml/2006/compatibility" xmlns:p14="http://schemas.microsoft.com/office/powerpoint/2010/main" xmlns:p15="http://schemas.microsoft.com/office/powerpoint/2012/main">
+  <p:cSld>
+    <p:spTree>
+      <p:nvGrpSpPr>
+        <p:cNvPr id="119" name="Shape 119"/>
+        <p:cNvGrpSpPr/>
+        <p:nvPr/>
+      </p:nvGrpSpPr>
+      <p:grpSpPr>
+        <a:xfrm>
+          <a:off x="0" y="0"/>
+          <a:ext cx="0" cy="0"/>
+          <a:chOff x="0" y="0"/>
+          <a:chExt cx="0" cy="0"/>
+        </a:xfrm>
+      </p:grpSpPr>
+      <p:sp>
+        <p:nvSpPr>
+          <p:cNvPr id="120" name="Google Shape;120;p20"/>
+          <p:cNvSpPr txBox="1"/>
+          <p:nvPr>
+            <p:ph idx="1" type="body"/>
+          </p:nvPr>
+        </p:nvSpPr>
+        <p:spPr>
+          <a:xfrm>
+            <a:off x="838200" y="680484"/>
+            <a:ext cx="10515600" cy="5496600"/>
+          </a:xfrm>
+          <a:prstGeom prst="rect">
+            <a:avLst/>
+          </a:prstGeom>
+          <a:noFill/>
+          <a:ln cap="flat" cmpd="sng" w="9525">
+            <a:solidFill>
+              <a:srgbClr val="00B050"/>
+            </a:solidFill>
+            <a:prstDash val="solid"/>
+            <a:round/>
+            <a:headEnd len="sm" w="sm" type="none"/>
+            <a:tailEnd len="sm" w="sm" type="none"/>
+          </a:ln>
+        </p:spPr>
+        <p:txBody>
+          <a:bodyPr anchorCtr="0" anchor="t" bIns="45700" lIns="91425" spcFirstLastPara="1" rIns="91425" wrap="square" tIns="45700">
+            <a:noAutofit/>
+          </a:bodyPr>
+          <a:lstStyle/>
+          <a:p>
+            <a:pPr indent="0" lvl="0" marL="0" rtl="0" algn="l">
+              <a:lnSpc>
+                <a:spcPct val="90000"/>
+              </a:lnSpc>
+              <a:spcBef>
+                <a:spcPts val="0"/>
+              </a:spcBef>
+              <a:spcAft>
+                <a:spcPts val="0"/>
+              </a:spcAft>
+              <a:buClr>
+                <a:srgbClr val="00B050"/>
+              </a:buClr>
+              <a:buSzPts val="1800"/>
+              <a:buNone/>
+            </a:pPr>
+            <a:r>
+              <a:rPr lang="en-GB" sz="1800">
+                <a:solidFill>
+                  <a:srgbClr val="00B050"/>
+                </a:solidFill>
+                <a:latin typeface="Arial"/>
+                <a:ea typeface="Arial"/>
+                <a:cs typeface="Arial"/>
+                <a:sym typeface="Arial"/>
+              </a:rPr>
+              <a:t>6. Market Research / Market Place:</a:t>
+            </a:r>
+            <a:endParaRPr/>
+          </a:p>
+          <a:p>
+            <a:pPr indent="0" lvl="0" marL="0" rtl="0" algn="l">
+              <a:lnSpc>
+                <a:spcPct val="90000"/>
+              </a:lnSpc>
+              <a:spcBef>
+                <a:spcPts val="1000"/>
+              </a:spcBef>
+              <a:spcAft>
+                <a:spcPts val="0"/>
+              </a:spcAft>
+              <a:buClr>
+                <a:schemeClr val="dk1"/>
+              </a:buClr>
+              <a:buSzPts val="1600"/>
+              <a:buNone/>
+            </a:pPr>
+            <a:r>
+              <a:rPr lang="en-GB" sz="1600">
+                <a:latin typeface="Arial"/>
+                <a:ea typeface="Arial"/>
+                <a:cs typeface="Arial"/>
+                <a:sym typeface="Arial"/>
+              </a:rPr>
+              <a:t>Understanding the latest in the market to bench-mark and ensure the new release of the products are at or above the market standards and are of interest to the customers.</a:t>
+            </a:r>
+            <a:endParaRPr/>
+          </a:p>
+          <a:p>
+            <a:pPr indent="0" lvl="0" marL="0" rtl="0" algn="l">
+              <a:lnSpc>
+                <a:spcPct val="90000"/>
+              </a:lnSpc>
+              <a:spcBef>
+                <a:spcPts val="1000"/>
+              </a:spcBef>
+              <a:spcAft>
+                <a:spcPts val="0"/>
+              </a:spcAft>
+              <a:buClr>
+                <a:schemeClr val="dk1"/>
+              </a:buClr>
+              <a:buSzPts val="1600"/>
+              <a:buNone/>
+            </a:pPr>
+            <a:r>
+              <a:t/>
+            </a:r>
+            <a:endParaRPr sz="1600">
+              <a:latin typeface="Arial"/>
+              <a:ea typeface="Arial"/>
+              <a:cs typeface="Arial"/>
+              <a:sym typeface="Arial"/>
+            </a:endParaRPr>
+          </a:p>
+          <a:p>
+            <a:pPr indent="0" lvl="0" marL="0" rtl="0" algn="l">
+              <a:lnSpc>
+                <a:spcPct val="90000"/>
+              </a:lnSpc>
+              <a:spcBef>
+                <a:spcPts val="1000"/>
+              </a:spcBef>
+              <a:spcAft>
+                <a:spcPts val="0"/>
+              </a:spcAft>
+              <a:buClr>
+                <a:schemeClr val="dk1"/>
+              </a:buClr>
+              <a:buSzPts val="1600"/>
+              <a:buNone/>
+            </a:pPr>
+            <a:r>
+              <a:rPr lang="en-GB" sz="1600">
+                <a:latin typeface="Arial"/>
+                <a:ea typeface="Arial"/>
+                <a:cs typeface="Arial"/>
+                <a:sym typeface="Arial"/>
+              </a:rPr>
+              <a:t>Real-life projects:</a:t>
+            </a:r>
+            <a:endParaRPr/>
+          </a:p>
+          <a:p>
+            <a:pPr indent="0" lvl="0" marL="0" rtl="0" algn="l">
+              <a:lnSpc>
+                <a:spcPct val="90000"/>
+              </a:lnSpc>
+              <a:spcBef>
+                <a:spcPts val="1000"/>
+              </a:spcBef>
+              <a:spcAft>
+                <a:spcPts val="0"/>
+              </a:spcAft>
+              <a:buNone/>
+            </a:pPr>
+            <a:r>
+              <a:rPr lang="en-GB" sz="1600">
+                <a:latin typeface="Arial"/>
+                <a:ea typeface="Arial"/>
+                <a:cs typeface="Arial"/>
+                <a:sym typeface="Arial"/>
+              </a:rPr>
+              <a:t>1) August 2018: Understanding the present version of Monitise Mobile Products, and researching existing information in the form of documentation on confluence, and build road map and requirements and Behaviour Driven Development BDD’s for the new release of Monitise Enterprise Platform. </a:t>
             </a:r>
             <a:endParaRPr sz="1600">
               <a:latin typeface="Arial"/>

</xml_diff>